<commit_message>
Make changes to presentation, add image
</commit_message>
<xml_diff>
--- a/Presentation/OpenBazaarSlides.pptx
+++ b/Presentation/OpenBazaarSlides.pptx
@@ -5,10 +5,10 @@
     <p:sldMasterId id="2147483648" r:id="rId2"/>
   </p:sldMasterIdLst>
   <p:notesMasterIdLst>
-    <p:notesMasterId r:id="rId13"/>
+    <p:notesMasterId r:id="rId11"/>
   </p:notesMasterIdLst>
   <p:handoutMasterIdLst>
-    <p:handoutMasterId r:id="rId14"/>
+    <p:handoutMasterId r:id="rId12"/>
   </p:handoutMasterIdLst>
   <p:sldIdLst>
     <p:sldId id="267" r:id="rId3"/>
@@ -18,9 +18,7 @@
     <p:sldId id="280" r:id="rId7"/>
     <p:sldId id="281" r:id="rId8"/>
     <p:sldId id="282" r:id="rId9"/>
-    <p:sldId id="283" r:id="rId10"/>
-    <p:sldId id="285" r:id="rId11"/>
-    <p:sldId id="272" r:id="rId12"/>
+    <p:sldId id="272" r:id="rId10"/>
   </p:sldIdLst>
   <p:sldSz cx="12192000" cy="6858000"/>
   <p:notesSz cx="6858000" cy="9144000"/>
@@ -223,7 +221,7 @@
           <a:p>
             <a:fld id="{9A591099-7EBE-4D12-B880-CCA6B38B92A6}" type="datetimeFigureOut">
               <a:rPr lang="en-US" smtClean="0"/>
-              <a:t>11/27/2015</a:t>
+              <a:t>11/28/2015</a:t>
             </a:fld>
             <a:endParaRPr lang="en-US"/>
           </a:p>
@@ -388,7 +386,7 @@
           <a:p>
             <a:fld id="{70CF4299-1721-48C6-878D-74296BE00D21}" type="datetimeFigureOut">
               <a:rPr lang="en-US" smtClean="0"/>
-              <a:t>11/27/2015</a:t>
+              <a:t>11/28/2015</a:t>
             </a:fld>
             <a:endParaRPr lang="en-US"/>
           </a:p>
@@ -934,7 +932,7 @@
           <a:p>
             <a:fld id="{49580562-E361-4901-81A9-DC99371C70DE}" type="datetime1">
               <a:rPr lang="en-US" smtClean="0"/>
-              <a:t>11/27/2015</a:t>
+              <a:t>11/28/2015</a:t>
             </a:fld>
             <a:endParaRPr lang="en-US"/>
           </a:p>
@@ -1130,7 +1128,7 @@
           <a:p>
             <a:fld id="{FA3E088F-5C71-4C3B-A46F-E5E332BBC3D1}" type="datetime1">
               <a:rPr lang="en-US" smtClean="0"/>
-              <a:t>11/27/2015</a:t>
+              <a:t>11/28/2015</a:t>
             </a:fld>
             <a:endParaRPr lang="en-US"/>
           </a:p>
@@ -1312,7 +1310,7 @@
           <a:p>
             <a:fld id="{46F79E80-105D-4CD8-AF07-4CEB9B9063CC}" type="datetime1">
               <a:rPr lang="en-US" smtClean="0"/>
-              <a:t>11/27/2015</a:t>
+              <a:t>11/28/2015</a:t>
             </a:fld>
             <a:endParaRPr lang="en-US"/>
           </a:p>
@@ -1535,7 +1533,7 @@
           <a:p>
             <a:fld id="{059F2C64-0D63-44AF-997A-1B1FE1A96E19}" type="datetime1">
               <a:rPr lang="en-US" smtClean="0"/>
-              <a:t>11/27/2015</a:t>
+              <a:t>11/28/2015</a:t>
             </a:fld>
             <a:endParaRPr lang="en-US"/>
           </a:p>
@@ -1839,7 +1837,7 @@
           <a:p>
             <a:fld id="{993EA110-C81D-4C5F-84B3-B5F5E7416EB9}" type="datetime1">
               <a:rPr lang="en-US" smtClean="0"/>
-              <a:t>11/27/2015</a:t>
+              <a:t>11/28/2015</a:t>
             </a:fld>
             <a:endParaRPr lang="en-US"/>
           </a:p>
@@ -2291,7 +2289,7 @@
           <a:p>
             <a:fld id="{4C8EC5ED-4C80-4726-926C-338D85485045}" type="datetime1">
               <a:rPr lang="en-US" smtClean="0"/>
-              <a:t>11/27/2015</a:t>
+              <a:t>11/28/2015</a:t>
             </a:fld>
             <a:endParaRPr lang="en-US"/>
           </a:p>
@@ -2421,7 +2419,7 @@
           <a:p>
             <a:fld id="{88647976-C764-44D0-930D-1AC5846C8450}" type="datetime1">
               <a:rPr lang="en-US" smtClean="0"/>
-              <a:t>11/27/2015</a:t>
+              <a:t>11/28/2015</a:t>
             </a:fld>
             <a:endParaRPr lang="en-US"/>
           </a:p>
@@ -2542,7 +2540,7 @@
           <a:p>
             <a:fld id="{50FA5702-ECF8-4274-B6BF-9D5EEBC26FE5}" type="datetime1">
               <a:rPr lang="en-US" smtClean="0"/>
-              <a:t>11/27/2015</a:t>
+              <a:t>11/28/2015</a:t>
             </a:fld>
             <a:endParaRPr lang="en-US"/>
           </a:p>
@@ -2896,7 +2894,7 @@
           <a:p>
             <a:fld id="{40566C6A-A83C-4E27-990F-89F11F779CE0}" type="datetime1">
               <a:rPr lang="en-US" smtClean="0"/>
-              <a:t>11/27/2015</a:t>
+              <a:t>11/28/2015</a:t>
             </a:fld>
             <a:endParaRPr lang="en-US"/>
           </a:p>
@@ -3385,7 +3383,7 @@
           <a:p>
             <a:fld id="{D14E86EA-95E3-4DA0-97E2-7D1BBAC51A0F}" type="datetime1">
               <a:rPr lang="en-US" smtClean="0"/>
-              <a:t>11/27/2015</a:t>
+              <a:t>11/28/2015</a:t>
             </a:fld>
             <a:endParaRPr lang="en-US"/>
           </a:p>
@@ -3958,71 +3956,6 @@
 </p:sld>
 </file>
 
-<file path=ppt/slides/slide10.xml><?xml version="1.0" encoding="utf-8"?>
-<p:sld xmlns:a="http://schemas.openxmlformats.org/drawingml/2006/main" xmlns:r="http://schemas.openxmlformats.org/officeDocument/2006/relationships" xmlns:p="http://schemas.openxmlformats.org/presentationml/2006/main">
-  <p:cSld>
-    <p:spTree>
-      <p:nvGrpSpPr>
-        <p:cNvPr id="1" name=""/>
-        <p:cNvGrpSpPr/>
-        <p:nvPr/>
-      </p:nvGrpSpPr>
-      <p:grpSpPr>
-        <a:xfrm>
-          <a:off x="0" y="0"/>
-          <a:ext cx="0" cy="0"/>
-          <a:chOff x="0" y="0"/>
-          <a:chExt cx="0" cy="0"/>
-        </a:xfrm>
-      </p:grpSpPr>
-      <p:sp>
-        <p:nvSpPr>
-          <p:cNvPr id="2" name="Title 1"/>
-          <p:cNvSpPr>
-            <a:spLocks noGrp="1"/>
-          </p:cNvSpPr>
-          <p:nvPr>
-            <p:ph type="title"/>
-          </p:nvPr>
-        </p:nvSpPr>
-        <p:spPr/>
-        <p:txBody>
-          <a:bodyPr/>
-          <a:lstStyle/>
-          <a:p>
-            <a:r>
-              <a:rPr lang="en-US" dirty="0" smtClean="0"/>
-              <a:t>Demonstration</a:t>
-            </a:r>
-            <a:endParaRPr lang="en-US" dirty="0"/>
-          </a:p>
-        </p:txBody>
-      </p:sp>
-    </p:spTree>
-    <p:extLst>
-      <p:ext uri="{BB962C8B-B14F-4D97-AF65-F5344CB8AC3E}">
-        <p14:creationId xmlns:p14="http://schemas.microsoft.com/office/powerpoint/2010/main" val="3999759775"/>
-      </p:ext>
-    </p:extLst>
-  </p:cSld>
-  <p:clrMapOvr>
-    <a:masterClrMapping/>
-  </p:clrMapOvr>
-  <mc:AlternateContent xmlns:mc="http://schemas.openxmlformats.org/markup-compatibility/2006" xmlns:p14="http://schemas.microsoft.com/office/powerpoint/2010/main">
-    <mc:Choice Requires="p14">
-      <p:transition spd="med" p14:dur="700">
-        <p:fade/>
-      </p:transition>
-    </mc:Choice>
-    <mc:Fallback xmlns="">
-      <p:transition spd="med">
-        <p:fade/>
-      </p:transition>
-    </mc:Fallback>
-  </mc:AlternateContent>
-</p:sld>
-</file>
-
 <file path=ppt/slides/slide2.xml><?xml version="1.0" encoding="utf-8"?>
 <p:sld xmlns:a="http://schemas.openxmlformats.org/drawingml/2006/main" xmlns:r="http://schemas.openxmlformats.org/officeDocument/2006/relationships" xmlns:p="http://schemas.openxmlformats.org/presentationml/2006/main">
   <p:cSld>
@@ -4210,13 +4143,13 @@
   <p:clrMapOvr>
     <a:masterClrMapping/>
   </p:clrMapOvr>
-  <mc:AlternateContent xmlns:mc="http://schemas.openxmlformats.org/markup-compatibility/2006">
-    <mc:Choice xmlns:p14="http://schemas.microsoft.com/office/powerpoint/2010/main" Requires="p14">
+  <mc:AlternateContent xmlns:mc="http://schemas.openxmlformats.org/markup-compatibility/2006" xmlns:p14="http://schemas.microsoft.com/office/powerpoint/2010/main">
+    <mc:Choice Requires="p14">
       <p:transition spd="med" p14:dur="700">
         <p:fade/>
       </p:transition>
     </mc:Choice>
-    <mc:Fallback>
+    <mc:Fallback xmlns="">
       <p:transition spd="med">
         <p:fade/>
       </p:transition>
@@ -4267,18 +4200,6 @@
       </p:sp>
       <p:sp>
         <p:nvSpPr>
-          <p:cNvPr id="3" name="Picture Placeholder 2"/>
-          <p:cNvSpPr>
-            <a:spLocks noGrp="1"/>
-          </p:cNvSpPr>
-          <p:nvPr>
-            <p:ph type="pic" idx="1"/>
-          </p:nvPr>
-        </p:nvSpPr>
-        <p:spPr/>
-      </p:sp>
-      <p:sp>
-        <p:nvSpPr>
           <p:cNvPr id="4" name="Text Placeholder 3"/>
           <p:cNvSpPr>
             <a:spLocks noGrp="1"/>
@@ -4371,6 +4292,36 @@
           </a:p>
         </p:txBody>
       </p:sp>
+      <p:pic>
+        <p:nvPicPr>
+          <p:cNvPr id="7" name="Picture 6"/>
+          <p:cNvPicPr>
+            <a:picLocks noChangeAspect="1"/>
+          </p:cNvPicPr>
+          <p:nvPr/>
+        </p:nvPicPr>
+        <p:blipFill>
+          <a:blip r:embed="rId2">
+            <a:extLst>
+              <a:ext uri="{28A0092B-C50C-407E-A947-70E740481C1C}">
+                <a14:useLocalDpi xmlns:a14="http://schemas.microsoft.com/office/drawing/2010/main" val="0"/>
+              </a:ext>
+            </a:extLst>
+          </a:blip>
+          <a:stretch>
+            <a:fillRect/>
+          </a:stretch>
+        </p:blipFill>
+        <p:spPr>
+          <a:xfrm>
+            <a:off x="331464" y="1944618"/>
+            <a:ext cx="6638095" cy="2485714"/>
+          </a:xfrm>
+          <a:prstGeom prst="rect">
+            <a:avLst/>
+          </a:prstGeom>
+        </p:spPr>
+      </p:pic>
     </p:spTree>
     <p:extLst>
       <p:ext uri="{BB962C8B-B14F-4D97-AF65-F5344CB8AC3E}">
@@ -4461,7 +4412,6 @@
               <a:rPr lang="en-US" dirty="0" smtClean="0"/>
               <a:t>Search for items/services or browse through stores</a:t>
             </a:r>
-            <a:endParaRPr lang="en-US" dirty="0" smtClean="0"/>
           </a:p>
           <a:p>
             <a:r>
@@ -4474,7 +4424,6 @@
               <a:rPr lang="en-US" dirty="0" smtClean="0"/>
               <a:t>Potentially select goods and services to purchase</a:t>
             </a:r>
-            <a:endParaRPr lang="en-US" dirty="0" smtClean="0"/>
           </a:p>
         </p:txBody>
       </p:sp>
@@ -4488,13 +4437,13 @@
   <p:clrMapOvr>
     <a:masterClrMapping/>
   </p:clrMapOvr>
-  <mc:AlternateContent xmlns:mc="http://schemas.openxmlformats.org/markup-compatibility/2006">
-    <mc:Choice xmlns:p14="http://schemas.microsoft.com/office/powerpoint/2010/main" Requires="p14">
+  <mc:AlternateContent xmlns:mc="http://schemas.openxmlformats.org/markup-compatibility/2006" xmlns:p14="http://schemas.microsoft.com/office/powerpoint/2010/main">
+    <mc:Choice Requires="p14">
       <p:transition spd="med" p14:dur="700">
         <p:fade/>
       </p:transition>
     </mc:Choice>
-    <mc:Fallback>
+    <mc:Fallback xmlns="">
       <p:transition spd="med">
         <p:fade/>
       </p:transition>
@@ -4572,7 +4521,6 @@
               <a:rPr lang="en-US" dirty="0" smtClean="0"/>
               <a:t>(Necessary? Any additional points?)</a:t>
             </a:r>
-            <a:endParaRPr lang="en-US" dirty="0" smtClean="0"/>
           </a:p>
         </p:txBody>
       </p:sp>
@@ -4586,13 +4534,13 @@
   <p:clrMapOvr>
     <a:masterClrMapping/>
   </p:clrMapOvr>
-  <mc:AlternateContent xmlns:mc="http://schemas.openxmlformats.org/markup-compatibility/2006">
-    <mc:Choice xmlns:p14="http://schemas.microsoft.com/office/powerpoint/2010/main" Requires="p14">
+  <mc:AlternateContent xmlns:mc="http://schemas.openxmlformats.org/markup-compatibility/2006" xmlns:p14="http://schemas.microsoft.com/office/powerpoint/2010/main">
+    <mc:Choice Requires="p14">
       <p:transition spd="med" p14:dur="700">
         <p:fade/>
       </p:transition>
     </mc:Choice>
-    <mc:Fallback>
+    <mc:Fallback xmlns="">
       <p:transition spd="med">
         <p:fade/>
       </p:transition>
@@ -4868,13 +4816,13 @@
   <p:clrMapOvr>
     <a:masterClrMapping/>
   </p:clrMapOvr>
-  <mc:AlternateContent xmlns:mc="http://schemas.openxmlformats.org/markup-compatibility/2006">
-    <mc:Choice xmlns:p14="http://schemas.microsoft.com/office/powerpoint/2010/main" Requires="p14">
+  <mc:AlternateContent xmlns:mc="http://schemas.openxmlformats.org/markup-compatibility/2006" xmlns:p14="http://schemas.microsoft.com/office/powerpoint/2010/main">
+    <mc:Choice Requires="p14">
       <p:transition spd="med" p14:dur="700">
         <p:fade/>
       </p:transition>
     </mc:Choice>
-    <mc:Fallback>
+    <mc:Fallback xmlns="">
       <p:transition spd="med">
         <p:fade/>
       </p:transition>
@@ -5015,13 +4963,13 @@
   <p:clrMapOvr>
     <a:masterClrMapping/>
   </p:clrMapOvr>
-  <mc:AlternateContent xmlns:mc="http://schemas.openxmlformats.org/markup-compatibility/2006">
-    <mc:Choice xmlns:p14="http://schemas.microsoft.com/office/powerpoint/2010/main" Requires="p14">
+  <mc:AlternateContent xmlns:mc="http://schemas.openxmlformats.org/markup-compatibility/2006" xmlns:p14="http://schemas.microsoft.com/office/powerpoint/2010/main">
+    <mc:Choice Requires="p14">
       <p:transition spd="med" p14:dur="700">
         <p:fade/>
       </p:transition>
     </mc:Choice>
-    <mc:Fallback>
+    <mc:Fallback xmlns="">
       <p:transition spd="med">
         <p:fade/>
       </p:transition>
@@ -5063,251 +5011,30 @@
           <a:lstStyle/>
           <a:p>
             <a:r>
-              <a:rPr lang="en-CA" dirty="0" smtClean="0"/>
-              <a:t>Additional Features</a:t>
-            </a:r>
-            <a:endParaRPr lang="en-CA" dirty="0"/>
-          </a:p>
-        </p:txBody>
-      </p:sp>
-      <p:sp>
-        <p:nvSpPr>
-          <p:cNvPr id="3" name="Content Placeholder 2"/>
-          <p:cNvSpPr>
-            <a:spLocks noGrp="1"/>
-          </p:cNvSpPr>
-          <p:nvPr>
-            <p:ph idx="1"/>
-          </p:nvPr>
-        </p:nvSpPr>
-        <p:spPr/>
-        <p:txBody>
-          <a:bodyPr/>
-          <a:lstStyle/>
-          <a:p>
-            <a:r>
-              <a:rPr lang="en-CA" dirty="0" smtClean="0"/>
-              <a:t>Rating system for sellers and notaries</a:t>
-            </a:r>
-            <a:r>
-              <a:rPr lang="en-CA" dirty="0"/>
-              <a:t> </a:t>
-            </a:r>
-            <a:r>
-              <a:rPr lang="en-CA" dirty="0" smtClean="0"/>
-              <a:t>(?)</a:t>
-            </a:r>
-          </a:p>
-          <a:p>
-            <a:r>
-              <a:rPr lang="en-CA" dirty="0" smtClean="0"/>
-              <a:t>Change settings</a:t>
-            </a:r>
-          </a:p>
-          <a:p>
-            <a:r>
-              <a:rPr lang="en-CA" dirty="0" smtClean="0"/>
-              <a:t>Update personal information</a:t>
-            </a:r>
-          </a:p>
-          <a:p>
-            <a:r>
-              <a:rPr lang="en-CA" dirty="0" smtClean="0"/>
-              <a:t>(Anything else?)</a:t>
-            </a:r>
+              <a:rPr lang="en-US" dirty="0" smtClean="0"/>
+              <a:t>Demonstration</a:t>
+            </a:r>
+            <a:endParaRPr lang="en-US" dirty="0"/>
           </a:p>
         </p:txBody>
       </p:sp>
     </p:spTree>
     <p:extLst>
       <p:ext uri="{BB962C8B-B14F-4D97-AF65-F5344CB8AC3E}">
-        <p14:creationId xmlns:p14="http://schemas.microsoft.com/office/powerpoint/2010/main" val="562872220"/>
+        <p14:creationId xmlns:p14="http://schemas.microsoft.com/office/powerpoint/2010/main" val="3999759775"/>
       </p:ext>
     </p:extLst>
   </p:cSld>
   <p:clrMapOvr>
     <a:masterClrMapping/>
   </p:clrMapOvr>
-  <mc:AlternateContent xmlns:mc="http://schemas.openxmlformats.org/markup-compatibility/2006">
-    <mc:Choice xmlns:p14="http://schemas.microsoft.com/office/powerpoint/2010/main" Requires="p14">
+  <mc:AlternateContent xmlns:mc="http://schemas.openxmlformats.org/markup-compatibility/2006" xmlns:p14="http://schemas.microsoft.com/office/powerpoint/2010/main">
+    <mc:Choice Requires="p14">
       <p:transition spd="med" p14:dur="700">
         <p:fade/>
       </p:transition>
     </mc:Choice>
-    <mc:Fallback>
-      <p:transition spd="med">
-        <p:fade/>
-      </p:transition>
-    </mc:Fallback>
-  </mc:AlternateContent>
-</p:sld>
-</file>
-
-<file path=ppt/slides/slide9.xml><?xml version="1.0" encoding="utf-8"?>
-<p:sld xmlns:a="http://schemas.openxmlformats.org/drawingml/2006/main" xmlns:r="http://schemas.openxmlformats.org/officeDocument/2006/relationships" xmlns:p="http://schemas.openxmlformats.org/presentationml/2006/main">
-  <p:cSld>
-    <p:spTree>
-      <p:nvGrpSpPr>
-        <p:cNvPr id="1" name=""/>
-        <p:cNvGrpSpPr/>
-        <p:nvPr/>
-      </p:nvGrpSpPr>
-      <p:grpSpPr>
-        <a:xfrm>
-          <a:off x="0" y="0"/>
-          <a:ext cx="0" cy="0"/>
-          <a:chOff x="0" y="0"/>
-          <a:chExt cx="0" cy="0"/>
-        </a:xfrm>
-      </p:grpSpPr>
-      <p:sp>
-        <p:nvSpPr>
-          <p:cNvPr id="2" name="Title 1"/>
-          <p:cNvSpPr>
-            <a:spLocks noGrp="1"/>
-          </p:cNvSpPr>
-          <p:nvPr>
-            <p:ph type="title"/>
-          </p:nvPr>
-        </p:nvSpPr>
-        <p:spPr/>
-        <p:txBody>
-          <a:bodyPr/>
-          <a:lstStyle/>
-          <a:p>
-            <a:r>
-              <a:rPr lang="en-US" dirty="0" smtClean="0"/>
-              <a:t>Additional Features</a:t>
-            </a:r>
-            <a:endParaRPr lang="en-US" dirty="0"/>
-          </a:p>
-        </p:txBody>
-      </p:sp>
-      <p:sp>
-        <p:nvSpPr>
-          <p:cNvPr id="4" name="Text Placeholder 3"/>
-          <p:cNvSpPr>
-            <a:spLocks noGrp="1"/>
-          </p:cNvSpPr>
-          <p:nvPr>
-            <p:ph type="body" sz="half" idx="2"/>
-          </p:nvPr>
-        </p:nvSpPr>
-        <p:spPr>
-          <a:xfrm>
-            <a:off x="7830355" y="2101849"/>
-            <a:ext cx="3755093" cy="3139851"/>
-          </a:xfrm>
-        </p:spPr>
-        <p:txBody>
-          <a:bodyPr>
-            <a:normAutofit/>
-          </a:bodyPr>
-          <a:lstStyle/>
-          <a:p>
-            <a:pPr marL="285750" indent="-285750">
-              <a:buFont typeface="Arial" panose="020B0604020202020204" pitchFamily="34" charset="0"/>
-              <a:buChar char="•"/>
-            </a:pPr>
-            <a:r>
-              <a:rPr lang="en-CA" dirty="0" smtClean="0"/>
-              <a:t>Future rating </a:t>
-            </a:r>
-            <a:r>
-              <a:rPr lang="en-CA" dirty="0"/>
-              <a:t>system for sellers and notaries </a:t>
-            </a:r>
-            <a:r>
-              <a:rPr lang="en-CA" dirty="0" smtClean="0"/>
-              <a:t>(?)</a:t>
-            </a:r>
-          </a:p>
-          <a:p>
-            <a:pPr marL="285750" indent="-285750">
-              <a:buFont typeface="Arial" panose="020B0604020202020204" pitchFamily="34" charset="0"/>
-              <a:buChar char="•"/>
-            </a:pPr>
-            <a:r>
-              <a:rPr lang="en-CA" dirty="0" smtClean="0"/>
-              <a:t>Change </a:t>
-            </a:r>
-            <a:r>
-              <a:rPr lang="en-CA" dirty="0"/>
-              <a:t>settings</a:t>
-            </a:r>
-          </a:p>
-          <a:p>
-            <a:pPr marL="285750" indent="-285750">
-              <a:buFont typeface="Arial" panose="020B0604020202020204" pitchFamily="34" charset="0"/>
-              <a:buChar char="•"/>
-            </a:pPr>
-            <a:r>
-              <a:rPr lang="en-CA" dirty="0" smtClean="0"/>
-              <a:t>Update personal information</a:t>
-            </a:r>
-            <a:endParaRPr lang="en-CA" dirty="0"/>
-          </a:p>
-          <a:p>
-            <a:pPr marL="285750" indent="-285750">
-              <a:buFont typeface="Arial" panose="020B0604020202020204" pitchFamily="34" charset="0"/>
-              <a:buChar char="•"/>
-            </a:pPr>
-            <a:r>
-              <a:rPr lang="en-CA" dirty="0" smtClean="0"/>
-              <a:t>Anything else? Add picture of settings tab</a:t>
-            </a:r>
-            <a:endParaRPr lang="en-CA" dirty="0"/>
-          </a:p>
-          <a:p>
-            <a:pPr marL="285750" indent="-285750">
-              <a:buFont typeface="Arial" panose="020B0604020202020204" pitchFamily="34" charset="0"/>
-              <a:buChar char="•"/>
-            </a:pPr>
-            <a:endParaRPr lang="en-US" dirty="0" smtClean="0"/>
-          </a:p>
-          <a:p>
-            <a:pPr marL="285750" indent="-285750">
-              <a:buFont typeface="Arial" panose="020B0604020202020204" pitchFamily="34" charset="0"/>
-              <a:buChar char="•"/>
-            </a:pPr>
-            <a:endParaRPr lang="en-US" dirty="0"/>
-          </a:p>
-        </p:txBody>
-      </p:sp>
-      <p:sp>
-        <p:nvSpPr>
-          <p:cNvPr id="3" name="Picture Placeholder 2"/>
-          <p:cNvSpPr>
-            <a:spLocks noGrp="1"/>
-          </p:cNvSpPr>
-          <p:nvPr>
-            <p:ph type="pic" idx="1"/>
-          </p:nvPr>
-        </p:nvSpPr>
-        <p:spPr>
-          <a:xfrm>
-            <a:off x="0" y="-2"/>
-            <a:ext cx="7302321" cy="6858001"/>
-          </a:xfrm>
-        </p:spPr>
-      </p:sp>
-    </p:spTree>
-    <p:extLst>
-      <p:ext uri="{BB962C8B-B14F-4D97-AF65-F5344CB8AC3E}">
-        <p14:creationId xmlns:p14="http://schemas.microsoft.com/office/powerpoint/2010/main" val="2644046831"/>
-      </p:ext>
-    </p:extLst>
-  </p:cSld>
-  <p:clrMapOvr>
-    <a:masterClrMapping/>
-  </p:clrMapOvr>
-  <mc:AlternateContent xmlns:mc="http://schemas.openxmlformats.org/markup-compatibility/2006">
-    <mc:Choice xmlns:p14="http://schemas.microsoft.com/office/powerpoint/2010/main" Requires="p14">
-      <p:transition spd="med" p14:dur="700">
-        <p:fade/>
-      </p:transition>
-    </mc:Choice>
-    <mc:Fallback>
+    <mc:Fallback xmlns="">
       <p:transition spd="med">
         <p:fade/>
       </p:transition>

</xml_diff>

<commit_message>
Make small changes to presentation
</commit_message>
<xml_diff>
--- a/Presentation/OpenBazaarSlides.pptx
+++ b/Presentation/OpenBazaarSlides.pptx
@@ -221,7 +221,7 @@
           <a:p>
             <a:fld id="{9A591099-7EBE-4D12-B880-CCA6B38B92A6}" type="datetimeFigureOut">
               <a:rPr lang="en-US" smtClean="0"/>
-              <a:t>11/28/2015</a:t>
+              <a:t>11/29/2015</a:t>
             </a:fld>
             <a:endParaRPr lang="en-US"/>
           </a:p>
@@ -386,7 +386,7 @@
           <a:p>
             <a:fld id="{70CF4299-1721-48C6-878D-74296BE00D21}" type="datetimeFigureOut">
               <a:rPr lang="en-US" smtClean="0"/>
-              <a:t>11/28/2015</a:t>
+              <a:t>11/29/2015</a:t>
             </a:fld>
             <a:endParaRPr lang="en-US"/>
           </a:p>
@@ -932,7 +932,7 @@
           <a:p>
             <a:fld id="{49580562-E361-4901-81A9-DC99371C70DE}" type="datetime1">
               <a:rPr lang="en-US" smtClean="0"/>
-              <a:t>11/28/2015</a:t>
+              <a:t>11/29/2015</a:t>
             </a:fld>
             <a:endParaRPr lang="en-US"/>
           </a:p>
@@ -1128,7 +1128,7 @@
           <a:p>
             <a:fld id="{FA3E088F-5C71-4C3B-A46F-E5E332BBC3D1}" type="datetime1">
               <a:rPr lang="en-US" smtClean="0"/>
-              <a:t>11/28/2015</a:t>
+              <a:t>11/29/2015</a:t>
             </a:fld>
             <a:endParaRPr lang="en-US"/>
           </a:p>
@@ -1310,7 +1310,7 @@
           <a:p>
             <a:fld id="{46F79E80-105D-4CD8-AF07-4CEB9B9063CC}" type="datetime1">
               <a:rPr lang="en-US" smtClean="0"/>
-              <a:t>11/28/2015</a:t>
+              <a:t>11/29/2015</a:t>
             </a:fld>
             <a:endParaRPr lang="en-US"/>
           </a:p>
@@ -1533,7 +1533,7 @@
           <a:p>
             <a:fld id="{059F2C64-0D63-44AF-997A-1B1FE1A96E19}" type="datetime1">
               <a:rPr lang="en-US" smtClean="0"/>
-              <a:t>11/28/2015</a:t>
+              <a:t>11/29/2015</a:t>
             </a:fld>
             <a:endParaRPr lang="en-US"/>
           </a:p>
@@ -1837,7 +1837,7 @@
           <a:p>
             <a:fld id="{993EA110-C81D-4C5F-84B3-B5F5E7416EB9}" type="datetime1">
               <a:rPr lang="en-US" smtClean="0"/>
-              <a:t>11/28/2015</a:t>
+              <a:t>11/29/2015</a:t>
             </a:fld>
             <a:endParaRPr lang="en-US"/>
           </a:p>
@@ -2289,7 +2289,7 @@
           <a:p>
             <a:fld id="{4C8EC5ED-4C80-4726-926C-338D85485045}" type="datetime1">
               <a:rPr lang="en-US" smtClean="0"/>
-              <a:t>11/28/2015</a:t>
+              <a:t>11/29/2015</a:t>
             </a:fld>
             <a:endParaRPr lang="en-US"/>
           </a:p>
@@ -2419,7 +2419,7 @@
           <a:p>
             <a:fld id="{88647976-C764-44D0-930D-1AC5846C8450}" type="datetime1">
               <a:rPr lang="en-US" smtClean="0"/>
-              <a:t>11/28/2015</a:t>
+              <a:t>11/29/2015</a:t>
             </a:fld>
             <a:endParaRPr lang="en-US"/>
           </a:p>
@@ -2540,7 +2540,7 @@
           <a:p>
             <a:fld id="{50FA5702-ECF8-4274-B6BF-9D5EEBC26FE5}" type="datetime1">
               <a:rPr lang="en-US" smtClean="0"/>
-              <a:t>11/28/2015</a:t>
+              <a:t>11/29/2015</a:t>
             </a:fld>
             <a:endParaRPr lang="en-US"/>
           </a:p>
@@ -2894,7 +2894,7 @@
           <a:p>
             <a:fld id="{40566C6A-A83C-4E27-990F-89F11F779CE0}" type="datetime1">
               <a:rPr lang="en-US" smtClean="0"/>
-              <a:t>11/28/2015</a:t>
+              <a:t>11/29/2015</a:t>
             </a:fld>
             <a:endParaRPr lang="en-US"/>
           </a:p>
@@ -3383,7 +3383,7 @@
           <a:p>
             <a:fld id="{D14E86EA-95E3-4DA0-97E2-7D1BBAC51A0F}" type="datetime1">
               <a:rPr lang="en-US" smtClean="0"/>
-              <a:t>11/28/2015</a:t>
+              <a:t>11/29/2015</a:t>
             </a:fld>
             <a:endParaRPr lang="en-US"/>
           </a:p>
@@ -4513,14 +4513,13 @@
             </a:r>
             <a:r>
               <a:rPr lang="en-US" dirty="0" smtClean="0"/>
-              <a:t>-style Peer-to-Peer Network to allow the possibility of connecting millions of people</a:t>
-            </a:r>
-          </a:p>
-          <a:p>
+              <a:t>-style Peer-to-Peer Network to allow the possibility of connecting millions of </a:t>
+            </a:r>
             <a:r>
               <a:rPr lang="en-US" dirty="0" smtClean="0"/>
-              <a:t>(Necessary? Any additional points?)</a:t>
-            </a:r>
+              <a:t>people</a:t>
+            </a:r>
+            <a:endParaRPr lang="en-US" dirty="0" smtClean="0"/>
           </a:p>
         </p:txBody>
       </p:sp>
@@ -4890,7 +4889,15 @@
           <a:p>
             <a:r>
               <a:rPr lang="en-CA" dirty="0"/>
-              <a:t>A contract describing the item and specifying the terms of sale is generated by seller and posted to their store</a:t>
+              <a:t>A contract describing the item and specifying the terms of sale is generated by </a:t>
+            </a:r>
+            <a:r>
+              <a:rPr lang="en-CA" dirty="0" smtClean="0"/>
+              <a:t>the seller </a:t>
+            </a:r>
+            <a:r>
+              <a:rPr lang="en-CA" dirty="0"/>
+              <a:t>and posted to their store</a:t>
             </a:r>
           </a:p>
           <a:p>
@@ -4924,7 +4931,19 @@
           <a:p>
             <a:r>
               <a:rPr lang="en-CA" dirty="0"/>
-              <a:t>If both parties agree that the contract is satisfied, the Bitcoin funds may transfer from one party to another</a:t>
+              <a:t>If both parties agree that the contract is satisfied, the Bitcoin funds </a:t>
+            </a:r>
+            <a:r>
+              <a:rPr lang="en-CA" dirty="0" smtClean="0"/>
+              <a:t>are able to</a:t>
+            </a:r>
+            <a:r>
+              <a:rPr lang="en-CA" dirty="0" smtClean="0"/>
+              <a:t> </a:t>
+            </a:r>
+            <a:r>
+              <a:rPr lang="en-CA" dirty="0"/>
+              <a:t>transfer from one party to another</a:t>
             </a:r>
           </a:p>
           <a:p>

</xml_diff>